<commit_message>
update week 2 powerpoint
</commit_message>
<xml_diff>
--- a/PSYC411/part1/ppt/wk2/PSYC411 Lecture week2 part3 handout.pptx
+++ b/PSYC411/part1/ppt/wk2/PSYC411 Lecture week2 part3 handout.pptx
@@ -14,7 +14,7 @@
     <p:handoutMasterId r:id="rId21"/>
   </p:handoutMasterIdLst>
   <p:sldIdLst>
-    <p:sldId id="456" r:id="rId5"/>
+    <p:sldId id="457" r:id="rId5"/>
     <p:sldId id="406" r:id="rId6"/>
     <p:sldId id="420" r:id="rId7"/>
     <p:sldId id="408" r:id="rId8"/>
@@ -149,7 +149,7 @@
 <file path=ppt/revisionInfo.xml><?xml version="1.0" encoding="utf-8"?>
 <p1510:revInfo xmlns:a="http://schemas.openxmlformats.org/drawingml/2006/main" xmlns:r="http://schemas.openxmlformats.org/officeDocument/2006/relationships" xmlns:p1510="http://schemas.microsoft.com/office/powerpoint/2015/10/main">
   <p1510:revLst>
-    <p1510:client id="{A9D3CE22-81AF-E843-8B33-8A8AE7E01A91}" v="2" dt="2024-09-28T15:48:25.123"/>
+    <p1510:client id="{ED3D8FE9-F343-5B4E-AC11-3987BA3D73DB}" v="1" dt="2025-10-07T12:09:55.127"/>
   </p1510:revLst>
 </p1510:revInfo>
 </file>
@@ -157,9 +157,46 @@
 <file path=ppt/changesInfos/changesInfo1.xml><?xml version="1.0" encoding="utf-8"?>
 <pc:chgInfo xmlns:a="http://schemas.openxmlformats.org/drawingml/2006/main" xmlns:r="http://schemas.openxmlformats.org/officeDocument/2006/relationships" xmlns:ac="http://schemas.microsoft.com/office/drawing/2013/main/command" xmlns:pc="http://schemas.microsoft.com/office/powerpoint/2013/main/command">
   <pc:docChgLst>
+    <pc:chgData name="Monaghan, Padraic" userId="dc80ae16-2699-4a0b-b78d-b9031f41d4f1" providerId="ADAL" clId="{D4970CB3-902B-8141-ABB4-E3B3EBCA8EDC}"/>
+    <pc:docChg chg="addSld delSld modSld">
+      <pc:chgData name="Monaghan, Padraic" userId="dc80ae16-2699-4a0b-b78d-b9031f41d4f1" providerId="ADAL" clId="{D4970CB3-902B-8141-ABB4-E3B3EBCA8EDC}" dt="2024-09-28T15:47:57.026" v="3" actId="2696"/>
+      <pc:docMkLst>
+        <pc:docMk/>
+      </pc:docMkLst>
+      <pc:sldChg chg="add">
+        <pc:chgData name="Monaghan, Padraic" userId="dc80ae16-2699-4a0b-b78d-b9031f41d4f1" providerId="ADAL" clId="{D4970CB3-902B-8141-ABB4-E3B3EBCA8EDC}" dt="2024-09-28T15:47:56.051" v="2"/>
+        <pc:sldMkLst>
+          <pc:docMk/>
+          <pc:sldMk cId="2854461246" sldId="406"/>
+        </pc:sldMkLst>
+      </pc:sldChg>
+      <pc:sldChg chg="del">
+        <pc:chgData name="Monaghan, Padraic" userId="dc80ae16-2699-4a0b-b78d-b9031f41d4f1" providerId="ADAL" clId="{D4970CB3-902B-8141-ABB4-E3B3EBCA8EDC}" dt="2024-09-28T15:34:07.301" v="1" actId="2696"/>
+        <pc:sldMkLst>
+          <pc:docMk/>
+          <pc:sldMk cId="3108243136" sldId="455"/>
+        </pc:sldMkLst>
+      </pc:sldChg>
+      <pc:sldChg chg="del">
+        <pc:chgData name="Monaghan, Padraic" userId="dc80ae16-2699-4a0b-b78d-b9031f41d4f1" providerId="ADAL" clId="{D4970CB3-902B-8141-ABB4-E3B3EBCA8EDC}" dt="2024-09-28T15:47:57.026" v="3" actId="2696"/>
+        <pc:sldMkLst>
+          <pc:docMk/>
+          <pc:sldMk cId="2718913426" sldId="456"/>
+        </pc:sldMkLst>
+      </pc:sldChg>
+      <pc:sldChg chg="add">
+        <pc:chgData name="Monaghan, Padraic" userId="dc80ae16-2699-4a0b-b78d-b9031f41d4f1" providerId="ADAL" clId="{D4970CB3-902B-8141-ABB4-E3B3EBCA8EDC}" dt="2024-09-28T15:34:06.162" v="0"/>
+        <pc:sldMkLst>
+          <pc:docMk/>
+          <pc:sldMk cId="1123433278" sldId="457"/>
+        </pc:sldMkLst>
+      </pc:sldChg>
+    </pc:docChg>
+  </pc:docChgLst>
+  <pc:docChgLst>
     <pc:chgData name="Monaghan, Padraic" userId="dc80ae16-2699-4a0b-b78d-b9031f41d4f1" providerId="ADAL" clId="{4351E3D4-C437-C04F-9203-1B0974C39F71}"/>
-    <pc:docChg chg="undo redo custSel modSld">
-      <pc:chgData name="Monaghan, Padraic" userId="dc80ae16-2699-4a0b-b78d-b9031f41d4f1" providerId="ADAL" clId="{4351E3D4-C437-C04F-9203-1B0974C39F71}" dt="2021-09-24T10:31:01.435" v="229" actId="2711"/>
+    <pc:docChg chg="undo redo custSel addSld delSld modSld">
+      <pc:chgData name="Monaghan, Padraic" userId="dc80ae16-2699-4a0b-b78d-b9031f41d4f1" providerId="ADAL" clId="{4351E3D4-C437-C04F-9203-1B0974C39F71}" dt="2021-09-24T10:40:34.243" v="355" actId="962"/>
       <pc:docMkLst>
         <pc:docMk/>
       </pc:docMkLst>
@@ -169,14 +206,6 @@
           <pc:docMk/>
           <pc:sldMk cId="2854461246" sldId="406"/>
         </pc:sldMkLst>
-        <pc:spChg chg="mod">
-          <ac:chgData name="Monaghan, Padraic" userId="dc80ae16-2699-4a0b-b78d-b9031f41d4f1" providerId="ADAL" clId="{4351E3D4-C437-C04F-9203-1B0974C39F71}" dt="2021-09-24T09:48:19.830" v="3" actId="20577"/>
-          <ac:spMkLst>
-            <pc:docMk/>
-            <pc:sldMk cId="2854461246" sldId="406"/>
-            <ac:spMk id="3" creationId="{05F47D82-9E70-9D4B-9EBD-DED3F25D9551}"/>
-          </ac:spMkLst>
-        </pc:spChg>
       </pc:sldChg>
       <pc:sldChg chg="modSp mod">
         <pc:chgData name="Monaghan, Padraic" userId="dc80ae16-2699-4a0b-b78d-b9031f41d4f1" providerId="ADAL" clId="{4351E3D4-C437-C04F-9203-1B0974C39F71}" dt="2021-09-24T10:28:04.431" v="144" actId="20577"/>
@@ -184,16 +213,118 @@
           <pc:docMk/>
           <pc:sldMk cId="500025644" sldId="429"/>
         </pc:sldMkLst>
+      </pc:sldChg>
+      <pc:sldChg chg="modSp mod">
+        <pc:chgData name="Monaghan, Padraic" userId="dc80ae16-2699-4a0b-b78d-b9031f41d4f1" providerId="ADAL" clId="{4351E3D4-C437-C04F-9203-1B0974C39F71}" dt="2021-09-24T10:24:50.156" v="72" actId="2711"/>
+        <pc:sldMkLst>
+          <pc:docMk/>
+          <pc:sldMk cId="2227700059" sldId="447"/>
+        </pc:sldMkLst>
+      </pc:sldChg>
+      <pc:sldChg chg="modSp mod">
+        <pc:chgData name="Monaghan, Padraic" userId="dc80ae16-2699-4a0b-b78d-b9031f41d4f1" providerId="ADAL" clId="{4351E3D4-C437-C04F-9203-1B0974C39F71}" dt="2021-09-24T10:25:08.708" v="75" actId="2711"/>
+        <pc:sldMkLst>
+          <pc:docMk/>
+          <pc:sldMk cId="108149488" sldId="448"/>
+        </pc:sldMkLst>
+      </pc:sldChg>
+      <pc:sldChg chg="modSp mod">
+        <pc:chgData name="Monaghan, Padraic" userId="dc80ae16-2699-4a0b-b78d-b9031f41d4f1" providerId="ADAL" clId="{4351E3D4-C437-C04F-9203-1B0974C39F71}" dt="2021-09-24T10:30:01.788" v="213" actId="2711"/>
+        <pc:sldMkLst>
+          <pc:docMk/>
+          <pc:sldMk cId="919400456" sldId="449"/>
+        </pc:sldMkLst>
+      </pc:sldChg>
+      <pc:sldChg chg="modSp mod">
+        <pc:chgData name="Monaghan, Padraic" userId="dc80ae16-2699-4a0b-b78d-b9031f41d4f1" providerId="ADAL" clId="{4351E3D4-C437-C04F-9203-1B0974C39F71}" dt="2021-09-24T10:30:44.367" v="226" actId="20577"/>
+        <pc:sldMkLst>
+          <pc:docMk/>
+          <pc:sldMk cId="918407466" sldId="450"/>
+        </pc:sldMkLst>
+      </pc:sldChg>
+      <pc:sldChg chg="modSp mod">
+        <pc:chgData name="Monaghan, Padraic" userId="dc80ae16-2699-4a0b-b78d-b9031f41d4f1" providerId="ADAL" clId="{4351E3D4-C437-C04F-9203-1B0974C39F71}" dt="2021-09-24T10:31:01.435" v="229" actId="2711"/>
+        <pc:sldMkLst>
+          <pc:docMk/>
+          <pc:sldMk cId="4211852169" sldId="451"/>
+        </pc:sldMkLst>
+      </pc:sldChg>
+      <pc:sldChg chg="modSp mod">
+        <pc:chgData name="Monaghan, Padraic" userId="dc80ae16-2699-4a0b-b78d-b9031f41d4f1" providerId="ADAL" clId="{4351E3D4-C437-C04F-9203-1B0974C39F71}" dt="2021-09-24T10:29:22.931" v="205" actId="255"/>
+        <pc:sldMkLst>
+          <pc:docMk/>
+          <pc:sldMk cId="3012151460" sldId="452"/>
+        </pc:sldMkLst>
+      </pc:sldChg>
+      <pc:sldChg chg="modSp mod">
+        <pc:chgData name="Monaghan, Padraic" userId="dc80ae16-2699-4a0b-b78d-b9031f41d4f1" providerId="ADAL" clId="{4351E3D4-C437-C04F-9203-1B0974C39F71}" dt="2021-09-24T10:40:34.243" v="355" actId="962"/>
+        <pc:sldMkLst>
+          <pc:docMk/>
+          <pc:sldMk cId="3523165778" sldId="453"/>
+        </pc:sldMkLst>
+      </pc:sldChg>
+      <pc:sldChg chg="del">
+        <pc:chgData name="Monaghan, Padraic" userId="dc80ae16-2699-4a0b-b78d-b9031f41d4f1" providerId="ADAL" clId="{4351E3D4-C437-C04F-9203-1B0974C39F71}" dt="2021-09-24T10:40:12.554" v="231" actId="2696"/>
+        <pc:sldMkLst>
+          <pc:docMk/>
+          <pc:sldMk cId="802161060" sldId="454"/>
+        </pc:sldMkLst>
+      </pc:sldChg>
+      <pc:sldChg chg="add">
+        <pc:chgData name="Monaghan, Padraic" userId="dc80ae16-2699-4a0b-b78d-b9031f41d4f1" providerId="ADAL" clId="{4351E3D4-C437-C04F-9203-1B0974C39F71}" dt="2021-09-24T10:40:11.052" v="230"/>
+        <pc:sldMkLst>
+          <pc:docMk/>
+          <pc:sldMk cId="3108243136" sldId="455"/>
+        </pc:sldMkLst>
+      </pc:sldChg>
+    </pc:docChg>
+  </pc:docChgLst>
+  <pc:docChgLst>
+    <pc:chgData name="Monaghan, Padraic" userId="dc80ae16-2699-4a0b-b78d-b9031f41d4f1" providerId="ADAL" clId="{65BEB97F-8AA2-8946-9A80-5122981194BA}"/>
+    <pc:docChg chg="addSld delSld modSld">
+      <pc:chgData name="Monaghan, Padraic" userId="dc80ae16-2699-4a0b-b78d-b9031f41d4f1" providerId="ADAL" clId="{65BEB97F-8AA2-8946-9A80-5122981194BA}" dt="2022-10-11T09:26:43.689" v="1" actId="2696"/>
+      <pc:docMkLst>
+        <pc:docMk/>
+      </pc:docMkLst>
+      <pc:sldChg chg="del">
+        <pc:chgData name="Monaghan, Padraic" userId="dc80ae16-2699-4a0b-b78d-b9031f41d4f1" providerId="ADAL" clId="{65BEB97F-8AA2-8946-9A80-5122981194BA}" dt="2022-10-11T09:26:43.689" v="1" actId="2696"/>
+        <pc:sldMkLst>
+          <pc:docMk/>
+          <pc:sldMk cId="2854461246" sldId="406"/>
+        </pc:sldMkLst>
+      </pc:sldChg>
+      <pc:sldChg chg="add">
+        <pc:chgData name="Monaghan, Padraic" userId="dc80ae16-2699-4a0b-b78d-b9031f41d4f1" providerId="ADAL" clId="{65BEB97F-8AA2-8946-9A80-5122981194BA}" dt="2022-10-11T09:26:41.911" v="0"/>
+        <pc:sldMkLst>
+          <pc:docMk/>
+          <pc:sldMk cId="2718913426" sldId="456"/>
+        </pc:sldMkLst>
+      </pc:sldChg>
+    </pc:docChg>
+  </pc:docChgLst>
+  <pc:docChgLst>
+    <pc:chgData name="Monaghan, Padraic" userId="dc80ae16-2699-4a0b-b78d-b9031f41d4f1" providerId="ADAL" clId="{02E33B94-E17C-5E30-9290-C0C88CB6F4FF}"/>
+    <pc:docChg chg="custSel modSld">
+      <pc:chgData name="Monaghan, Padraic" userId="dc80ae16-2699-4a0b-b78d-b9031f41d4f1" providerId="ADAL" clId="{02E33B94-E17C-5E30-9290-C0C88CB6F4FF}" dt="2025-10-07T12:14:09.762" v="170" actId="20577"/>
+      <pc:docMkLst>
+        <pc:docMk/>
+      </pc:docMkLst>
+      <pc:sldChg chg="modSp mod">
+        <pc:chgData name="Monaghan, Padraic" userId="dc80ae16-2699-4a0b-b78d-b9031f41d4f1" providerId="ADAL" clId="{02E33B94-E17C-5E30-9290-C0C88CB6F4FF}" dt="2025-10-07T12:12:02.116" v="150" actId="14100"/>
+        <pc:sldMkLst>
+          <pc:docMk/>
+          <pc:sldMk cId="500025644" sldId="429"/>
+        </pc:sldMkLst>
         <pc:spChg chg="mod">
-          <ac:chgData name="Monaghan, Padraic" userId="dc80ae16-2699-4a0b-b78d-b9031f41d4f1" providerId="ADAL" clId="{4351E3D4-C437-C04F-9203-1B0974C39F71}" dt="2021-09-24T10:28:04.431" v="144" actId="20577"/>
+          <ac:chgData name="Monaghan, Padraic" userId="dc80ae16-2699-4a0b-b78d-b9031f41d4f1" providerId="ADAL" clId="{02E33B94-E17C-5E30-9290-C0C88CB6F4FF}" dt="2025-10-07T12:11:33.004" v="143" actId="20577"/>
           <ac:spMkLst>
             <pc:docMk/>
             <pc:sldMk cId="500025644" sldId="429"/>
             <ac:spMk id="2" creationId="{00000000-0000-0000-0000-000000000000}"/>
           </ac:spMkLst>
         </pc:spChg>
-        <pc:picChg chg="mod">
-          <ac:chgData name="Monaghan, Padraic" userId="dc80ae16-2699-4a0b-b78d-b9031f41d4f1" providerId="ADAL" clId="{4351E3D4-C437-C04F-9203-1B0974C39F71}" dt="2021-09-24T10:27:36.161" v="141" actId="14100"/>
+        <pc:picChg chg="mod modCrop">
+          <ac:chgData name="Monaghan, Padraic" userId="dc80ae16-2699-4a0b-b78d-b9031f41d4f1" providerId="ADAL" clId="{02E33B94-E17C-5E30-9290-C0C88CB6F4FF}" dt="2025-10-07T12:12:02.116" v="150" actId="14100"/>
           <ac:picMkLst>
             <pc:docMk/>
             <pc:sldMk cId="500025644" sldId="429"/>
@@ -202,13 +333,28 @@
         </pc:picChg>
       </pc:sldChg>
       <pc:sldChg chg="modSp mod">
-        <pc:chgData name="Monaghan, Padraic" userId="dc80ae16-2699-4a0b-b78d-b9031f41d4f1" providerId="ADAL" clId="{4351E3D4-C437-C04F-9203-1B0974C39F71}" dt="2021-09-24T10:24:50.156" v="72" actId="2711"/>
+        <pc:chgData name="Monaghan, Padraic" userId="dc80ae16-2699-4a0b-b78d-b9031f41d4f1" providerId="ADAL" clId="{02E33B94-E17C-5E30-9290-C0C88CB6F4FF}" dt="2025-10-07T12:12:15.821" v="156" actId="20577"/>
+        <pc:sldMkLst>
+          <pc:docMk/>
+          <pc:sldMk cId="335979763" sldId="443"/>
+        </pc:sldMkLst>
+        <pc:spChg chg="mod">
+          <ac:chgData name="Monaghan, Padraic" userId="dc80ae16-2699-4a0b-b78d-b9031f41d4f1" providerId="ADAL" clId="{02E33B94-E17C-5E30-9290-C0C88CB6F4FF}" dt="2025-10-07T12:12:15.821" v="156" actId="20577"/>
+          <ac:spMkLst>
+            <pc:docMk/>
+            <pc:sldMk cId="335979763" sldId="443"/>
+            <ac:spMk id="2" creationId="{00000000-0000-0000-0000-000000000000}"/>
+          </ac:spMkLst>
+        </pc:spChg>
+      </pc:sldChg>
+      <pc:sldChg chg="modSp mod">
+        <pc:chgData name="Monaghan, Padraic" userId="dc80ae16-2699-4a0b-b78d-b9031f41d4f1" providerId="ADAL" clId="{02E33B94-E17C-5E30-9290-C0C88CB6F4FF}" dt="2025-10-07T12:10:15.129" v="33" actId="20577"/>
         <pc:sldMkLst>
           <pc:docMk/>
           <pc:sldMk cId="2227700059" sldId="447"/>
         </pc:sldMkLst>
         <pc:spChg chg="mod">
-          <ac:chgData name="Monaghan, Padraic" userId="dc80ae16-2699-4a0b-b78d-b9031f41d4f1" providerId="ADAL" clId="{4351E3D4-C437-C04F-9203-1B0974C39F71}" dt="2021-09-24T10:24:50.156" v="72" actId="2711"/>
+          <ac:chgData name="Monaghan, Padraic" userId="dc80ae16-2699-4a0b-b78d-b9031f41d4f1" providerId="ADAL" clId="{02E33B94-E17C-5E30-9290-C0C88CB6F4FF}" dt="2025-10-07T12:10:15.129" v="33" actId="20577"/>
           <ac:spMkLst>
             <pc:docMk/>
             <pc:sldMk cId="2227700059" sldId="447"/>
@@ -217,28 +363,13 @@
         </pc:spChg>
       </pc:sldChg>
       <pc:sldChg chg="modSp mod">
-        <pc:chgData name="Monaghan, Padraic" userId="dc80ae16-2699-4a0b-b78d-b9031f41d4f1" providerId="ADAL" clId="{4351E3D4-C437-C04F-9203-1B0974C39F71}" dt="2021-09-24T10:25:08.708" v="75" actId="2711"/>
-        <pc:sldMkLst>
-          <pc:docMk/>
-          <pc:sldMk cId="108149488" sldId="448"/>
-        </pc:sldMkLst>
-        <pc:spChg chg="mod">
-          <ac:chgData name="Monaghan, Padraic" userId="dc80ae16-2699-4a0b-b78d-b9031f41d4f1" providerId="ADAL" clId="{4351E3D4-C437-C04F-9203-1B0974C39F71}" dt="2021-09-24T10:25:08.708" v="75" actId="2711"/>
-          <ac:spMkLst>
-            <pc:docMk/>
-            <pc:sldMk cId="108149488" sldId="448"/>
-            <ac:spMk id="2" creationId="{00000000-0000-0000-0000-000000000000}"/>
-          </ac:spMkLst>
-        </pc:spChg>
-      </pc:sldChg>
-      <pc:sldChg chg="modSp mod">
-        <pc:chgData name="Monaghan, Padraic" userId="dc80ae16-2699-4a0b-b78d-b9031f41d4f1" providerId="ADAL" clId="{4351E3D4-C437-C04F-9203-1B0974C39F71}" dt="2021-09-24T10:30:01.788" v="213" actId="2711"/>
+        <pc:chgData name="Monaghan, Padraic" userId="dc80ae16-2699-4a0b-b78d-b9031f41d4f1" providerId="ADAL" clId="{02E33B94-E17C-5E30-9290-C0C88CB6F4FF}" dt="2025-10-07T12:13:47.260" v="168" actId="20577"/>
         <pc:sldMkLst>
           <pc:docMk/>
           <pc:sldMk cId="919400456" sldId="449"/>
         </pc:sldMkLst>
         <pc:spChg chg="mod">
-          <ac:chgData name="Monaghan, Padraic" userId="dc80ae16-2699-4a0b-b78d-b9031f41d4f1" providerId="ADAL" clId="{4351E3D4-C437-C04F-9203-1B0974C39F71}" dt="2021-09-24T10:30:01.788" v="213" actId="2711"/>
+          <ac:chgData name="Monaghan, Padraic" userId="dc80ae16-2699-4a0b-b78d-b9031f41d4f1" providerId="ADAL" clId="{02E33B94-E17C-5E30-9290-C0C88CB6F4FF}" dt="2025-10-07T12:13:47.260" v="168" actId="20577"/>
           <ac:spMkLst>
             <pc:docMk/>
             <pc:sldMk cId="919400456" sldId="449"/>
@@ -247,13 +378,13 @@
         </pc:spChg>
       </pc:sldChg>
       <pc:sldChg chg="modSp mod">
-        <pc:chgData name="Monaghan, Padraic" userId="dc80ae16-2699-4a0b-b78d-b9031f41d4f1" providerId="ADAL" clId="{4351E3D4-C437-C04F-9203-1B0974C39F71}" dt="2021-09-24T10:30:44.367" v="226" actId="20577"/>
+        <pc:chgData name="Monaghan, Padraic" userId="dc80ae16-2699-4a0b-b78d-b9031f41d4f1" providerId="ADAL" clId="{02E33B94-E17C-5E30-9290-C0C88CB6F4FF}" dt="2025-10-07T12:14:09.762" v="170" actId="20577"/>
         <pc:sldMkLst>
           <pc:docMk/>
           <pc:sldMk cId="918407466" sldId="450"/>
         </pc:sldMkLst>
         <pc:spChg chg="mod">
-          <ac:chgData name="Monaghan, Padraic" userId="dc80ae16-2699-4a0b-b78d-b9031f41d4f1" providerId="ADAL" clId="{4351E3D4-C437-C04F-9203-1B0974C39F71}" dt="2021-09-24T10:30:44.367" v="226" actId="20577"/>
+          <ac:chgData name="Monaghan, Padraic" userId="dc80ae16-2699-4a0b-b78d-b9031f41d4f1" providerId="ADAL" clId="{02E33B94-E17C-5E30-9290-C0C88CB6F4FF}" dt="2025-10-07T12:14:09.762" v="170" actId="20577"/>
           <ac:spMkLst>
             <pc:docMk/>
             <pc:sldMk cId="918407466" sldId="450"/>
@@ -262,94 +393,19 @@
         </pc:spChg>
       </pc:sldChg>
       <pc:sldChg chg="modSp mod">
-        <pc:chgData name="Monaghan, Padraic" userId="dc80ae16-2699-4a0b-b78d-b9031f41d4f1" providerId="ADAL" clId="{4351E3D4-C437-C04F-9203-1B0974C39F71}" dt="2021-09-24T10:31:01.435" v="229" actId="2711"/>
-        <pc:sldMkLst>
-          <pc:docMk/>
-          <pc:sldMk cId="4211852169" sldId="451"/>
-        </pc:sldMkLst>
-        <pc:spChg chg="mod">
-          <ac:chgData name="Monaghan, Padraic" userId="dc80ae16-2699-4a0b-b78d-b9031f41d4f1" providerId="ADAL" clId="{4351E3D4-C437-C04F-9203-1B0974C39F71}" dt="2021-09-24T10:31:01.435" v="229" actId="2711"/>
-          <ac:spMkLst>
-            <pc:docMk/>
-            <pc:sldMk cId="4211852169" sldId="451"/>
-            <ac:spMk id="2" creationId="{00000000-0000-0000-0000-000000000000}"/>
-          </ac:spMkLst>
-        </pc:spChg>
-      </pc:sldChg>
-      <pc:sldChg chg="modSp mod">
-        <pc:chgData name="Monaghan, Padraic" userId="dc80ae16-2699-4a0b-b78d-b9031f41d4f1" providerId="ADAL" clId="{4351E3D4-C437-C04F-9203-1B0974C39F71}" dt="2021-09-24T10:29:22.931" v="205" actId="255"/>
+        <pc:chgData name="Monaghan, Padraic" userId="dc80ae16-2699-4a0b-b78d-b9031f41d4f1" providerId="ADAL" clId="{02E33B94-E17C-5E30-9290-C0C88CB6F4FF}" dt="2025-10-07T12:12:31.199" v="160" actId="20577"/>
         <pc:sldMkLst>
           <pc:docMk/>
           <pc:sldMk cId="3012151460" sldId="452"/>
         </pc:sldMkLst>
         <pc:spChg chg="mod">
-          <ac:chgData name="Monaghan, Padraic" userId="dc80ae16-2699-4a0b-b78d-b9031f41d4f1" providerId="ADAL" clId="{4351E3D4-C437-C04F-9203-1B0974C39F71}" dt="2021-09-24T10:29:22.931" v="205" actId="255"/>
+          <ac:chgData name="Monaghan, Padraic" userId="dc80ae16-2699-4a0b-b78d-b9031f41d4f1" providerId="ADAL" clId="{02E33B94-E17C-5E30-9290-C0C88CB6F4FF}" dt="2025-10-07T12:12:31.199" v="160" actId="20577"/>
           <ac:spMkLst>
             <pc:docMk/>
             <pc:sldMk cId="3012151460" sldId="452"/>
             <ac:spMk id="2" creationId="{00000000-0000-0000-0000-000000000000}"/>
           </ac:spMkLst>
         </pc:spChg>
-      </pc:sldChg>
-    </pc:docChg>
-  </pc:docChgLst>
-  <pc:docChgLst>
-    <pc:chgData name="Monaghan, Padraic" userId="dc80ae16-2699-4a0b-b78d-b9031f41d4f1" providerId="ADAL" clId="{9640BF4D-EBC9-AC49-9933-214D9B7204CA}"/>
-    <pc:docChg chg="addSld delSld modSld">
-      <pc:chgData name="Monaghan, Padraic" userId="dc80ae16-2699-4a0b-b78d-b9031f41d4f1" providerId="ADAL" clId="{9640BF4D-EBC9-AC49-9933-214D9B7204CA}" dt="2022-10-11T09:26:24.321" v="1" actId="2696"/>
-      <pc:docMkLst>
-        <pc:docMk/>
-      </pc:docMkLst>
-      <pc:sldChg chg="del">
-        <pc:chgData name="Monaghan, Padraic" userId="dc80ae16-2699-4a0b-b78d-b9031f41d4f1" providerId="ADAL" clId="{9640BF4D-EBC9-AC49-9933-214D9B7204CA}" dt="2022-10-11T09:26:24.321" v="1" actId="2696"/>
-        <pc:sldMkLst>
-          <pc:docMk/>
-          <pc:sldMk cId="2854461246" sldId="406"/>
-        </pc:sldMkLst>
-      </pc:sldChg>
-      <pc:sldChg chg="add">
-        <pc:chgData name="Monaghan, Padraic" userId="dc80ae16-2699-4a0b-b78d-b9031f41d4f1" providerId="ADAL" clId="{9640BF4D-EBC9-AC49-9933-214D9B7204CA}" dt="2022-10-11T09:26:21.338" v="0"/>
-        <pc:sldMkLst>
-          <pc:docMk/>
-          <pc:sldMk cId="1870986566" sldId="455"/>
-        </pc:sldMkLst>
-      </pc:sldChg>
-    </pc:docChg>
-  </pc:docChgLst>
-  <pc:docChgLst>
-    <pc:chgData name="Monaghan, Padraic" userId="dc80ae16-2699-4a0b-b78d-b9031f41d4f1" providerId="ADAL" clId="{A9D3CE22-81AF-E843-8B33-8A8AE7E01A91}"/>
-    <pc:docChg chg="addSld delSld modSld">
-      <pc:chgData name="Monaghan, Padraic" userId="dc80ae16-2699-4a0b-b78d-b9031f41d4f1" providerId="ADAL" clId="{A9D3CE22-81AF-E843-8B33-8A8AE7E01A91}" dt="2024-09-28T15:48:26.087" v="3" actId="2696"/>
-      <pc:docMkLst>
-        <pc:docMk/>
-      </pc:docMkLst>
-      <pc:sldChg chg="add">
-        <pc:chgData name="Monaghan, Padraic" userId="dc80ae16-2699-4a0b-b78d-b9031f41d4f1" providerId="ADAL" clId="{A9D3CE22-81AF-E843-8B33-8A8AE7E01A91}" dt="2024-09-28T15:48:25.119" v="2"/>
-        <pc:sldMkLst>
-          <pc:docMk/>
-          <pc:sldMk cId="2854461246" sldId="406"/>
-        </pc:sldMkLst>
-      </pc:sldChg>
-      <pc:sldChg chg="del">
-        <pc:chgData name="Monaghan, Padraic" userId="dc80ae16-2699-4a0b-b78d-b9031f41d4f1" providerId="ADAL" clId="{A9D3CE22-81AF-E843-8B33-8A8AE7E01A91}" dt="2024-09-28T15:35:41.066" v="1" actId="2696"/>
-        <pc:sldMkLst>
-          <pc:docMk/>
-          <pc:sldMk cId="802161060" sldId="454"/>
-        </pc:sldMkLst>
-      </pc:sldChg>
-      <pc:sldChg chg="del">
-        <pc:chgData name="Monaghan, Padraic" userId="dc80ae16-2699-4a0b-b78d-b9031f41d4f1" providerId="ADAL" clId="{A9D3CE22-81AF-E843-8B33-8A8AE7E01A91}" dt="2024-09-28T15:48:26.087" v="3" actId="2696"/>
-        <pc:sldMkLst>
-          <pc:docMk/>
-          <pc:sldMk cId="1870986566" sldId="455"/>
-        </pc:sldMkLst>
-      </pc:sldChg>
-      <pc:sldChg chg="add">
-        <pc:chgData name="Monaghan, Padraic" userId="dc80ae16-2699-4a0b-b78d-b9031f41d4f1" providerId="ADAL" clId="{A9D3CE22-81AF-E843-8B33-8A8AE7E01A91}" dt="2024-09-28T15:35:40.038" v="0"/>
-        <pc:sldMkLst>
-          <pc:docMk/>
-          <pc:sldMk cId="3108243136" sldId="456"/>
-        </pc:sldMkLst>
       </pc:sldChg>
     </pc:docChg>
   </pc:docChgLst>
@@ -438,7 +494,7 @@
           <a:p>
             <a:fld id="{1ED63D20-B0B3-D445-877E-AF329FAFBC9C}" type="datetimeFigureOut">
               <a:rPr lang="en-US" smtClean="0"/>
-              <a:t>9/28/24</a:t>
+              <a:t>10/7/25</a:t>
             </a:fld>
             <a:endParaRPr lang="en-GB"/>
           </a:p>
@@ -603,7 +659,7 @@
           <a:p>
             <a:fld id="{3D4CEEAF-8027-F64C-B8DD-D7E422C7FD2F}" type="datetimeFigureOut">
               <a:rPr lang="en-US" smtClean="0"/>
-              <a:t>9/28/24</a:t>
+              <a:t>10/7/25</a:t>
             </a:fld>
             <a:endParaRPr lang="en-GB"/>
           </a:p>
@@ -1004,7 +1060,7 @@
           <a:p>
             <a:fld id="{8014A0CB-84B6-8842-8670-F7D58B08EA78}" type="datetimeFigureOut">
               <a:rPr lang="en-US" smtClean="0"/>
-              <a:t>9/28/24</a:t>
+              <a:t>10/7/25</a:t>
             </a:fld>
             <a:endParaRPr lang="en-GB"/>
           </a:p>
@@ -1493,7 +1549,7 @@
             <a:fld id="{012ADEB9-B943-4968-ADF2-270CE1983704}" type="datetimeFigureOut">
               <a:rPr lang="en-GB" smtClean="0"/>
               <a:pPr/>
-              <a:t>28/09/2024</a:t>
+              <a:t>07/10/2025</a:t>
             </a:fld>
             <a:endParaRPr lang="en-GB"/>
           </a:p>
@@ -1860,7 +1916,7 @@
             <a:fld id="{012ADEB9-B943-4968-ADF2-270CE1983704}" type="datetimeFigureOut">
               <a:rPr lang="en-GB" smtClean="0"/>
               <a:pPr/>
-              <a:t>28/09/2024</a:t>
+              <a:t>07/10/2025</a:t>
             </a:fld>
             <a:endParaRPr lang="en-GB"/>
           </a:p>
@@ -2379,7 +2435,7 @@
             <a:fld id="{97CA41E8-ABA4-4C5B-81A5-5CD889FC8C0C}" type="datetimeFigureOut">
               <a:rPr lang="en-GB" smtClean="0"/>
               <a:pPr/>
-              <a:t>28/09/2024</a:t>
+              <a:t>07/10/2025</a:t>
             </a:fld>
             <a:endParaRPr lang="en-GB"/>
           </a:p>
@@ -2754,7 +2810,7 @@
             <a:fld id="{97CA41E8-ABA4-4C5B-81A5-5CD889FC8C0C}" type="datetimeFigureOut">
               <a:rPr lang="en-GB" smtClean="0"/>
               <a:pPr/>
-              <a:t>28/09/2024</a:t>
+              <a:t>07/10/2025</a:t>
             </a:fld>
             <a:endParaRPr lang="en-GB"/>
           </a:p>
@@ -3156,7 +3212,7 @@
             <a:fld id="{012ADEB9-B943-4968-ADF2-270CE1983704}" type="datetimeFigureOut">
               <a:rPr lang="en-GB" smtClean="0"/>
               <a:pPr/>
-              <a:t>28/09/2024</a:t>
+              <a:t>07/10/2025</a:t>
             </a:fld>
             <a:endParaRPr lang="en-GB"/>
           </a:p>
@@ -3486,7 +3542,7 @@
             <a:fld id="{012ADEB9-B943-4968-ADF2-270CE1983704}" type="datetimeFigureOut">
               <a:rPr lang="en-GB" smtClean="0"/>
               <a:pPr/>
-              <a:t>28/09/2024</a:t>
+              <a:t>07/10/2025</a:t>
             </a:fld>
             <a:endParaRPr lang="en-GB"/>
           </a:p>
@@ -3745,7 +3801,7 @@
             <a:fld id="{012ADEB9-B943-4968-ADF2-270CE1983704}" type="datetimeFigureOut">
               <a:rPr lang="en-GB" smtClean="0"/>
               <a:pPr/>
-              <a:t>28/09/2024</a:t>
+              <a:t>07/10/2025</a:t>
             </a:fld>
             <a:endParaRPr lang="en-GB"/>
           </a:p>
@@ -3889,7 +3945,7 @@
           <a:p>
             <a:fld id="{8014A0CB-84B6-8842-8670-F7D58B08EA78}" type="datetimeFigureOut">
               <a:rPr lang="en-US" smtClean="0"/>
-              <a:t>9/28/24</a:t>
+              <a:t>10/7/25</a:t>
             </a:fld>
             <a:endParaRPr lang="en-GB"/>
           </a:p>
@@ -4767,7 +4823,7 @@
           <a:p>
             <a:fld id="{8014A0CB-84B6-8842-8670-F7D58B08EA78}" type="datetimeFigureOut">
               <a:rPr lang="en-US" smtClean="0"/>
-              <a:t>9/28/24</a:t>
+              <a:t>10/7/25</a:t>
             </a:fld>
             <a:endParaRPr lang="en-GB"/>
           </a:p>
@@ -6089,7 +6145,7 @@
             <a:fld id="{012ADEB9-B943-4968-ADF2-270CE1983704}" type="datetimeFigureOut">
               <a:rPr lang="en-GB" smtClean="0"/>
               <a:pPr/>
-              <a:t>28/09/2024</a:t>
+              <a:t>07/10/2025</a:t>
             </a:fld>
             <a:endParaRPr lang="en-GB" dirty="0"/>
           </a:p>
@@ -6372,7 +6428,7 @@
             <a:fld id="{012ADEB9-B943-4968-ADF2-270CE1983704}" type="datetimeFigureOut">
               <a:rPr lang="en-GB" smtClean="0"/>
               <a:pPr/>
-              <a:t>28/09/2024</a:t>
+              <a:t>07/10/2025</a:t>
             </a:fld>
             <a:endParaRPr lang="en-GB" dirty="0"/>
           </a:p>
@@ -6655,7 +6711,7 @@
             <a:fld id="{012ADEB9-B943-4968-ADF2-270CE1983704}" type="datetimeFigureOut">
               <a:rPr lang="en-GB" smtClean="0"/>
               <a:pPr/>
-              <a:t>28/09/2024</a:t>
+              <a:t>07/10/2025</a:t>
             </a:fld>
             <a:endParaRPr lang="en-GB" dirty="0"/>
           </a:p>
@@ -6938,7 +6994,7 @@
             <a:fld id="{012ADEB9-B943-4968-ADF2-270CE1983704}" type="datetimeFigureOut">
               <a:rPr lang="en-GB" smtClean="0"/>
               <a:pPr/>
-              <a:t>28/09/2024</a:t>
+              <a:t>07/10/2025</a:t>
             </a:fld>
             <a:endParaRPr lang="en-GB" dirty="0"/>
           </a:p>
@@ -7305,7 +7361,7 @@
             <a:fld id="{97CA41E8-ABA4-4C5B-81A5-5CD889FC8C0C}" type="datetimeFigureOut">
               <a:rPr lang="en-GB" smtClean="0"/>
               <a:pPr/>
-              <a:t>28/09/2024</a:t>
+              <a:t>07/10/2025</a:t>
             </a:fld>
             <a:endParaRPr lang="en-GB"/>
           </a:p>
@@ -7959,7 +8015,7 @@
             <a:fld id="{97CA41E8-ABA4-4C5B-81A5-5CD889FC8C0C}" type="datetimeFigureOut">
               <a:rPr lang="en-GB" smtClean="0"/>
               <a:pPr/>
-              <a:t>28/09/2024</a:t>
+              <a:t>07/10/2025</a:t>
             </a:fld>
             <a:endParaRPr lang="en-GB"/>
           </a:p>
@@ -8146,7 +8202,7 @@
             <a:fld id="{012ADEB9-B943-4968-ADF2-270CE1983704}" type="datetimeFigureOut">
               <a:rPr lang="en-GB" smtClean="0"/>
               <a:pPr/>
-              <a:t>28/09/2024</a:t>
+              <a:t>07/10/2025</a:t>
             </a:fld>
             <a:endParaRPr lang="en-GB"/>
           </a:p>
@@ -8333,7 +8389,7 @@
             <a:fld id="{012ADEB9-B943-4968-ADF2-270CE1983704}" type="datetimeFigureOut">
               <a:rPr lang="en-GB" smtClean="0"/>
               <a:pPr/>
-              <a:t>28/09/2024</a:t>
+              <a:t>07/10/2025</a:t>
             </a:fld>
             <a:endParaRPr lang="en-GB"/>
           </a:p>
@@ -9949,7 +10005,7 @@
     </p:spTree>
     <p:extLst>
       <p:ext uri="{BB962C8B-B14F-4D97-AF65-F5344CB8AC3E}">
-        <p14:creationId xmlns:p14="http://schemas.microsoft.com/office/powerpoint/2010/main" val="3108243136"/>
+        <p14:creationId xmlns:p14="http://schemas.microsoft.com/office/powerpoint/2010/main" val="1123433278"/>
       </p:ext>
     </p:extLst>
   </p:cSld>
@@ -10001,15 +10057,7 @@
             </a:pPr>
             <a:r>
               <a:rPr lang="en-GB" dirty="0"/>
-              <a:t>In </a:t>
-            </a:r>
-            <a:r>
-              <a:rPr lang="en-GB" dirty="0" err="1"/>
-              <a:t>Rstudio</a:t>
-            </a:r>
-            <a:r>
-              <a:rPr lang="en-GB" dirty="0"/>
-              <a:t>, hopefully you only have to install packages once. But every time you open a </a:t>
+              <a:t>Every time you open a </a:t>
             </a:r>
             <a:r>
               <a:rPr lang="en-GB" dirty="0" err="1"/>
@@ -10142,7 +10190,7 @@
             <a:pPr lvl="1"/>
             <a:r>
               <a:rPr lang="en-GB" dirty="0"/>
-              <a:t>Then, browse to the directory “PSYC401/week2” (or whatever you’ve called your folder), and click “Open”. </a:t>
+              <a:t>Then, browse to the directory “PSYC411/week2” (or whatever you’ve called your folder), and click “Open”. </a:t>
             </a:r>
           </a:p>
           <a:p>
@@ -10184,7 +10232,7 @@
               <a:rPr lang="en-GB" sz="2200" dirty="0">
                 <a:latin typeface="Courier" pitchFamily="2" charset="0"/>
               </a:rPr>
-              <a:t>/PSYC401/week2")</a:t>
+              <a:t>/PSYC411/week2")</a:t>
             </a:r>
           </a:p>
           <a:p>
@@ -10277,7 +10325,7 @@
               <a:rPr lang="en-GB" dirty="0">
                 <a:latin typeface="Courier" pitchFamily="2" charset="0"/>
               </a:rPr>
-              <a:t>PSYC401-shipley-scores-anonymous-17_18.csv</a:t>
+              <a:t>PSYC411-shipley-scores-anonymous-17_18.csv</a:t>
             </a:r>
           </a:p>
           <a:p>
@@ -10302,7 +10350,7 @@
             </a:r>
             <a:r>
               <a:rPr lang="en-GB" dirty="0" err="1"/>
-              <a:t>read.csv</a:t>
+              <a:t>read_csv</a:t>
             </a:r>
             <a:r>
               <a:rPr lang="en-GB" dirty="0"/>
@@ -10324,13 +10372,13 @@
               <a:rPr lang="en-GB" dirty="0" err="1">
                 <a:latin typeface="Courier" pitchFamily="2" charset="0"/>
               </a:rPr>
-              <a:t>read.csv</a:t>
+              <a:t>read_csv</a:t>
             </a:r>
             <a:r>
               <a:rPr lang="en-GB" dirty="0">
                 <a:latin typeface="Courier" pitchFamily="2" charset="0"/>
               </a:rPr>
-              <a:t>("PSYC401-shipley-scores-anonymous-17_18.csv")</a:t>
+              <a:t>("PSYC411-shipley-scores-anonymous-17_18.csv")</a:t>
             </a:r>
           </a:p>
           <a:p>
@@ -10519,7 +10567,7 @@
               <a:rPr lang="en-GB" dirty="0">
                 <a:latin typeface="Courier" pitchFamily="2" charset="0"/>
               </a:rPr>
-              <a:t> &lt;- select(.data = </a:t>
+              <a:t> &lt;- select(</a:t>
             </a:r>
             <a:r>
               <a:rPr lang="en-GB" dirty="0" err="1">
@@ -10794,7 +10842,7 @@
       </p:sp>
       <p:pic>
         <p:nvPicPr>
-          <p:cNvPr id="5" name="Picture 4">
+          <p:cNvPr id="5" name="Picture 4" descr="R studio window showing commands from previous slides in situ.">
             <a:extLst>
               <a:ext uri="{FF2B5EF4-FFF2-40B4-BE49-F238E27FC236}">
                 <a16:creationId xmlns:a16="http://schemas.microsoft.com/office/drawing/2014/main" id="{7943DED9-53A3-4141-BD4A-85493D48F372}"/>
@@ -11298,7 +11346,7 @@
             </a:r>
             <a:r>
               <a:rPr lang="en-GB" dirty="0"/>
-              <a:t> (2016) provides a test of estimating people’s vocabulary</a:t>
+              <a:t> et al. (2016) provided an online test for estimating people’s vocabulary</a:t>
             </a:r>
           </a:p>
           <a:p>
@@ -11307,7 +11355,7 @@
               <a:rPr lang="en-GB" dirty="0">
                 <a:hlinkClick r:id="rId2"/>
               </a:rPr>
-              <a:t>http://vocabulary.ugent.be/</a:t>
+              <a:t>https://doi.org/10.3389/fpsyg.2016.01116</a:t>
             </a:r>
             <a:endParaRPr lang="en-GB" dirty="0"/>
           </a:p>
@@ -11321,7 +11369,7 @@
           <a:p>
             <a:r>
               <a:rPr lang="en-GB" dirty="0"/>
-              <a:t>For now, let’s look at two previous years’ PSYC401 students’ scores</a:t>
+              <a:t>For now, let’s look at two previous years’ PSYC411 students’ scores</a:t>
             </a:r>
           </a:p>
           <a:p>
@@ -11333,7 +11381,7 @@
               <a:rPr lang="en-GB" sz="2200" dirty="0">
                 <a:latin typeface="Courier" pitchFamily="2" charset="0"/>
               </a:rPr>
-              <a:t>PSYC401-shipley-scores-anonymous-17_18.csv</a:t>
+              <a:t>PSYC411-shipley-scores-anonymous-17_18.csv</a:t>
             </a:r>
             <a:r>
               <a:rPr lang="en-GB" dirty="0"/>
@@ -11343,7 +11391,7 @@
               <a:rPr lang="en-GB" sz="2200" dirty="0">
                 <a:latin typeface="Courier" pitchFamily="2" charset="0"/>
               </a:rPr>
-              <a:t>401/week2</a:t>
+              <a:t>411/week2</a:t>
             </a:r>
           </a:p>
           <a:p>
@@ -12090,14 +12138,14 @@
           <a:p>
             <a:r>
               <a:rPr lang="en-GB" dirty="0"/>
-              <a:t>To access certain functions we need to install certain libraries</a:t>
+              <a:t>To access certain functions we need to use certain libraries</a:t>
             </a:r>
           </a:p>
           <a:p>
             <a:pPr lvl="1"/>
             <a:r>
               <a:rPr lang="en-GB" dirty="0"/>
-              <a:t>We’ll install the “</a:t>
+              <a:t>In this case, we need the “</a:t>
             </a:r>
             <a:r>
               <a:rPr lang="en-GB" dirty="0" err="1"/>
@@ -12111,48 +12159,7 @@
           <a:p>
             <a:r>
               <a:rPr lang="en-GB" dirty="0"/>
-              <a:t>At the console, type </a:t>
-            </a:r>
-            <a:r>
-              <a:rPr lang="en-GB" dirty="0" err="1">
-                <a:latin typeface="Courier" pitchFamily="2" charset="0"/>
-              </a:rPr>
-              <a:t>install.packages</a:t>
-            </a:r>
-            <a:r>
-              <a:rPr lang="en-GB" dirty="0">
-                <a:latin typeface="Courier" pitchFamily="2" charset="0"/>
-              </a:rPr>
-              <a:t>("</a:t>
-            </a:r>
-            <a:r>
-              <a:rPr lang="en-GB" dirty="0" err="1">
-                <a:latin typeface="Courier" pitchFamily="2" charset="0"/>
-              </a:rPr>
-              <a:t>tidyverse</a:t>
-            </a:r>
-            <a:r>
-              <a:rPr lang="en-GB" dirty="0">
-                <a:latin typeface="Courier" pitchFamily="2" charset="0"/>
-              </a:rPr>
-              <a:t>")</a:t>
-            </a:r>
-            <a:r>
-              <a:rPr lang="en-GB" dirty="0"/>
-              <a:t> and press return</a:t>
-            </a:r>
-          </a:p>
-          <a:p>
-            <a:pPr lvl="1"/>
-            <a:r>
-              <a:rPr lang="en-GB" dirty="0"/>
-              <a:t>note you have to type it exactly like this, including all the dots and the double-quotation marks</a:t>
-            </a:r>
-          </a:p>
-          <a:p>
-            <a:r>
-              <a:rPr lang="en-GB" dirty="0"/>
-              <a:t>Then type </a:t>
+              <a:t>Type </a:t>
             </a:r>
             <a:r>
               <a:rPr lang="en-GB" dirty="0">
@@ -12227,14 +12234,15 @@
         </p:nvPicPr>
         <p:blipFill>
           <a:blip r:embed="rId2"/>
+          <a:srcRect t="45299"/>
           <a:stretch>
             <a:fillRect/>
           </a:stretch>
         </p:blipFill>
         <p:spPr>
           <a:xfrm>
-            <a:off x="2335427" y="4920401"/>
-            <a:ext cx="4811607" cy="1937599"/>
+            <a:off x="287860" y="3595817"/>
+            <a:ext cx="8526617" cy="1878226"/>
           </a:xfrm>
           <a:prstGeom prst="rect">
             <a:avLst/>

</xml_diff>